<commit_message>
Final Commit with Final Project Presentation
</commit_message>
<xml_diff>
--- a/Presentation/Project 1 Presentation_sat.pptx
+++ b/Presentation/Project 1 Presentation_sat.pptx
@@ -6230,10 +6230,220 @@
           <a:bodyPr/>
           <a:lstStyle/>
           <a:p>
-            <a:endParaRPr lang="en-US"/>
-          </a:p>
-        </p:txBody>
-      </p:sp>
+            <a:r>
+              <a:rPr lang="en-US" dirty="0"/>
+              <a:t>Imported all data sets for cleaning</a:t>
+            </a:r>
+          </a:p>
+          <a:p>
+            <a:r>
+              <a:rPr lang="en-US" dirty="0"/>
+              <a:t>Renaming columns in all data sets to be more meaningful to analysis </a:t>
+            </a:r>
+          </a:p>
+          <a:p>
+            <a:r>
+              <a:rPr lang="en-US" dirty="0"/>
+              <a:t>Dropping columns to only use relevant data to analysis</a:t>
+            </a:r>
+          </a:p>
+          <a:p>
+            <a:r>
+              <a:rPr lang="en-US" dirty="0"/>
+              <a:t>Adding summary columns for total degrees </a:t>
+            </a:r>
+          </a:p>
+          <a:p>
+            <a:r>
+              <a:rPr lang="en-US" dirty="0"/>
+              <a:t>Adding average unemployment rate for the states and separating for Ohio only</a:t>
+            </a:r>
+          </a:p>
+          <a:p>
+            <a:pPr marL="34290" indent="0">
+              <a:buNone/>
+            </a:pPr>
+            <a:endParaRPr lang="en-US" dirty="0"/>
+          </a:p>
+          <a:p>
+            <a:pPr marL="34290" indent="0">
+              <a:buNone/>
+            </a:pPr>
+            <a:r>
+              <a:rPr lang="en-US" dirty="0"/>
+              <a:t> Sample Code: </a:t>
+            </a:r>
+          </a:p>
+          <a:p>
+            <a:pPr marL="34290" indent="0">
+              <a:buNone/>
+            </a:pPr>
+            <a:endParaRPr lang="en-US" dirty="0"/>
+          </a:p>
+          <a:p>
+            <a:pPr marL="34290" indent="0">
+              <a:buNone/>
+            </a:pPr>
+            <a:r>
+              <a:rPr lang="en-US" dirty="0"/>
+              <a:t> </a:t>
+            </a:r>
+          </a:p>
+          <a:p>
+            <a:endParaRPr lang="en-US" dirty="0"/>
+          </a:p>
+        </p:txBody>
+      </p:sp>
+      <p:pic>
+        <p:nvPicPr>
+          <p:cNvPr id="11" name="Picture 10">
+            <a:extLst>
+              <a:ext uri="{FF2B5EF4-FFF2-40B4-BE49-F238E27FC236}">
+                <a16:creationId xmlns:a16="http://schemas.microsoft.com/office/drawing/2014/main" id="{DFD1C16B-DB82-45AD-8089-D64706F3DCA7}"/>
+              </a:ext>
+            </a:extLst>
+          </p:cNvPr>
+          <p:cNvPicPr>
+            <a:picLocks noChangeAspect="1"/>
+          </p:cNvPicPr>
+          <p:nvPr/>
+        </p:nvPicPr>
+        <p:blipFill>
+          <a:blip r:embed="rId2"/>
+          <a:stretch>
+            <a:fillRect/>
+          </a:stretch>
+        </p:blipFill>
+        <p:spPr>
+          <a:xfrm>
+            <a:off x="736601" y="4416804"/>
+            <a:ext cx="3086100" cy="457200"/>
+          </a:xfrm>
+          <a:prstGeom prst="rect">
+            <a:avLst/>
+          </a:prstGeom>
+        </p:spPr>
+      </p:pic>
+      <p:pic>
+        <p:nvPicPr>
+          <p:cNvPr id="13" name="Picture 12">
+            <a:extLst>
+              <a:ext uri="{FF2B5EF4-FFF2-40B4-BE49-F238E27FC236}">
+                <a16:creationId xmlns:a16="http://schemas.microsoft.com/office/drawing/2014/main" id="{12A0A43F-40A1-449D-8957-F8317F90F802}"/>
+              </a:ext>
+            </a:extLst>
+          </p:cNvPr>
+          <p:cNvPicPr>
+            <a:picLocks noChangeAspect="1"/>
+          </p:cNvPicPr>
+          <p:nvPr/>
+        </p:nvPicPr>
+        <p:blipFill>
+          <a:blip r:embed="rId3"/>
+          <a:stretch>
+            <a:fillRect/>
+          </a:stretch>
+        </p:blipFill>
+        <p:spPr>
+          <a:xfrm>
+            <a:off x="736601" y="5076138"/>
+            <a:ext cx="1933575" cy="438150"/>
+          </a:xfrm>
+          <a:prstGeom prst="rect">
+            <a:avLst/>
+          </a:prstGeom>
+        </p:spPr>
+      </p:pic>
+      <p:pic>
+        <p:nvPicPr>
+          <p:cNvPr id="15" name="Picture 14">
+            <a:extLst>
+              <a:ext uri="{FF2B5EF4-FFF2-40B4-BE49-F238E27FC236}">
+                <a16:creationId xmlns:a16="http://schemas.microsoft.com/office/drawing/2014/main" id="{EFC0466F-2E00-47C9-B251-FD85DA87C75F}"/>
+              </a:ext>
+            </a:extLst>
+          </p:cNvPr>
+          <p:cNvPicPr>
+            <a:picLocks noChangeAspect="1"/>
+          </p:cNvPicPr>
+          <p:nvPr/>
+        </p:nvPicPr>
+        <p:blipFill>
+          <a:blip r:embed="rId4"/>
+          <a:stretch>
+            <a:fillRect/>
+          </a:stretch>
+        </p:blipFill>
+        <p:spPr>
+          <a:xfrm>
+            <a:off x="3904026" y="4483479"/>
+            <a:ext cx="3886200" cy="323850"/>
+          </a:xfrm>
+          <a:prstGeom prst="rect">
+            <a:avLst/>
+          </a:prstGeom>
+        </p:spPr>
+      </p:pic>
+      <p:pic>
+        <p:nvPicPr>
+          <p:cNvPr id="19" name="Picture 18">
+            <a:extLst>
+              <a:ext uri="{FF2B5EF4-FFF2-40B4-BE49-F238E27FC236}">
+                <a16:creationId xmlns:a16="http://schemas.microsoft.com/office/drawing/2014/main" id="{DDC5AB40-9F86-4414-97A8-BED027E9D53A}"/>
+              </a:ext>
+            </a:extLst>
+          </p:cNvPr>
+          <p:cNvPicPr>
+            <a:picLocks noChangeAspect="1"/>
+          </p:cNvPicPr>
+          <p:nvPr/>
+        </p:nvPicPr>
+        <p:blipFill>
+          <a:blip r:embed="rId5"/>
+          <a:stretch>
+            <a:fillRect/>
+          </a:stretch>
+        </p:blipFill>
+        <p:spPr>
+          <a:xfrm>
+            <a:off x="5352414" y="5076138"/>
+            <a:ext cx="2905125" cy="400050"/>
+          </a:xfrm>
+          <a:prstGeom prst="rect">
+            <a:avLst/>
+          </a:prstGeom>
+        </p:spPr>
+      </p:pic>
+      <p:pic>
+        <p:nvPicPr>
+          <p:cNvPr id="21" name="Picture 20">
+            <a:extLst>
+              <a:ext uri="{FF2B5EF4-FFF2-40B4-BE49-F238E27FC236}">
+                <a16:creationId xmlns:a16="http://schemas.microsoft.com/office/drawing/2014/main" id="{9AD92B4B-E280-4D44-8615-8B9FD08BEAB3}"/>
+              </a:ext>
+            </a:extLst>
+          </p:cNvPr>
+          <p:cNvPicPr>
+            <a:picLocks noChangeAspect="1"/>
+          </p:cNvPicPr>
+          <p:nvPr/>
+        </p:nvPicPr>
+        <p:blipFill>
+          <a:blip r:embed="rId6"/>
+          <a:stretch>
+            <a:fillRect/>
+          </a:stretch>
+        </p:blipFill>
+        <p:spPr>
+          <a:xfrm>
+            <a:off x="2744470" y="5076138"/>
+            <a:ext cx="2533650" cy="400050"/>
+          </a:xfrm>
+          <a:prstGeom prst="rect">
+            <a:avLst/>
+          </a:prstGeom>
+        </p:spPr>
+      </p:pic>
     </p:spTree>
     <p:extLst>
       <p:ext uri="{BB962C8B-B14F-4D97-AF65-F5344CB8AC3E}">

</xml_diff>